<commit_message>
[MEL - 0003] - Forest of doubts adjustments
</commit_message>
<xml_diff>
--- a/Presentations/ForestOfDoubt.pptx
+++ b/Presentations/ForestOfDoubt.pptx
@@ -292,7 +292,7 @@
           <a:p>
             <a:fld id="{A18E2B5E-2BAC-408C-9D01-DD90C7E8DCBE}" type="datetimeFigureOut">
               <a:rPr lang="pt-PT" smtClean="0"/>
-              <a:t>13/07/2020</a:t>
+              <a:t>01/08/2020</a:t>
             </a:fld>
             <a:endParaRPr lang="pt-PT"/>
           </a:p>
@@ -504,7 +504,7 @@
           <a:p>
             <a:fld id="{A18E2B5E-2BAC-408C-9D01-DD90C7E8DCBE}" type="datetimeFigureOut">
               <a:rPr lang="pt-PT" smtClean="0"/>
-              <a:t>13/07/2020</a:t>
+              <a:t>01/08/2020</a:t>
             </a:fld>
             <a:endParaRPr lang="pt-PT"/>
           </a:p>
@@ -726,7 +726,7 @@
           <a:p>
             <a:fld id="{A18E2B5E-2BAC-408C-9D01-DD90C7E8DCBE}" type="datetimeFigureOut">
               <a:rPr lang="pt-PT" smtClean="0"/>
-              <a:t>13/07/2020</a:t>
+              <a:t>01/08/2020</a:t>
             </a:fld>
             <a:endParaRPr lang="pt-PT"/>
           </a:p>
@@ -938,7 +938,7 @@
           <a:p>
             <a:fld id="{A18E2B5E-2BAC-408C-9D01-DD90C7E8DCBE}" type="datetimeFigureOut">
               <a:rPr lang="pt-PT" smtClean="0"/>
-              <a:t>13/07/2020</a:t>
+              <a:t>01/08/2020</a:t>
             </a:fld>
             <a:endParaRPr lang="pt-PT"/>
           </a:p>
@@ -1226,7 +1226,7 @@
           <a:p>
             <a:fld id="{A18E2B5E-2BAC-408C-9D01-DD90C7E8DCBE}" type="datetimeFigureOut">
               <a:rPr lang="pt-PT" smtClean="0"/>
-              <a:t>13/07/2020</a:t>
+              <a:t>01/08/2020</a:t>
             </a:fld>
             <a:endParaRPr lang="pt-PT"/>
           </a:p>
@@ -1506,7 +1506,7 @@
           <a:p>
             <a:fld id="{A18E2B5E-2BAC-408C-9D01-DD90C7E8DCBE}" type="datetimeFigureOut">
               <a:rPr lang="pt-PT" smtClean="0"/>
-              <a:t>13/07/2020</a:t>
+              <a:t>01/08/2020</a:t>
             </a:fld>
             <a:endParaRPr lang="pt-PT"/>
           </a:p>
@@ -1933,7 +1933,7 @@
           <a:p>
             <a:fld id="{A18E2B5E-2BAC-408C-9D01-DD90C7E8DCBE}" type="datetimeFigureOut">
               <a:rPr lang="pt-PT" smtClean="0"/>
-              <a:t>13/07/2020</a:t>
+              <a:t>01/08/2020</a:t>
             </a:fld>
             <a:endParaRPr lang="pt-PT"/>
           </a:p>
@@ -2087,7 +2087,7 @@
           <a:p>
             <a:fld id="{A18E2B5E-2BAC-408C-9D01-DD90C7E8DCBE}" type="datetimeFigureOut">
               <a:rPr lang="pt-PT" smtClean="0"/>
-              <a:t>13/07/2020</a:t>
+              <a:t>01/08/2020</a:t>
             </a:fld>
             <a:endParaRPr lang="pt-PT"/>
           </a:p>
@@ -2212,7 +2212,7 @@
           <a:p>
             <a:fld id="{A18E2B5E-2BAC-408C-9D01-DD90C7E8DCBE}" type="datetimeFigureOut">
               <a:rPr lang="pt-PT" smtClean="0"/>
-              <a:t>13/07/2020</a:t>
+              <a:t>01/08/2020</a:t>
             </a:fld>
             <a:endParaRPr lang="pt-PT"/>
           </a:p>
@@ -2537,7 +2537,7 @@
           <a:p>
             <a:fld id="{A18E2B5E-2BAC-408C-9D01-DD90C7E8DCBE}" type="datetimeFigureOut">
               <a:rPr lang="pt-PT" smtClean="0"/>
-              <a:t>13/07/2020</a:t>
+              <a:t>01/08/2020</a:t>
             </a:fld>
             <a:endParaRPr lang="pt-PT"/>
           </a:p>
@@ -2838,7 +2838,7 @@
           <a:p>
             <a:fld id="{A18E2B5E-2BAC-408C-9D01-DD90C7E8DCBE}" type="datetimeFigureOut">
               <a:rPr lang="pt-PT" smtClean="0"/>
-              <a:t>13/07/2020</a:t>
+              <a:t>01/08/2020</a:t>
             </a:fld>
             <a:endParaRPr lang="pt-PT"/>
           </a:p>
@@ -3093,7 +3093,7 @@
           <a:p>
             <a:fld id="{A18E2B5E-2BAC-408C-9D01-DD90C7E8DCBE}" type="datetimeFigureOut">
               <a:rPr lang="pt-PT" smtClean="0"/>
-              <a:t>13/07/2020</a:t>
+              <a:t>01/08/2020</a:t>
             </a:fld>
             <a:endParaRPr lang="pt-PT"/>
           </a:p>
@@ -4240,13 +4240,13 @@
   <p:clrMapOvr>
     <a:masterClrMapping/>
   </p:clrMapOvr>
-  <mc:AlternateContent xmlns:mc="http://schemas.openxmlformats.org/markup-compatibility/2006">
-    <mc:Choice xmlns:p15="http://schemas.microsoft.com/office/powerpoint/2012/main" Requires="p15">
+  <mc:AlternateContent xmlns:mc="http://schemas.openxmlformats.org/markup-compatibility/2006" xmlns:p15="http://schemas.microsoft.com/office/powerpoint/2012/main">
+    <mc:Choice Requires="p15">
       <p:transition xmlns:p14="http://schemas.microsoft.com/office/powerpoint/2010/main" spd="slow" p14:dur="1250">
         <p15:prstTrans prst="peelOff"/>
       </p:transition>
     </mc:Choice>
-    <mc:Fallback>
+    <mc:Fallback xmlns="">
       <p:transition spd="slow">
         <p:fade/>
       </p:transition>
@@ -5270,13 +5270,13 @@
   <p:clrMapOvr>
     <a:masterClrMapping/>
   </p:clrMapOvr>
-  <mc:AlternateContent xmlns:mc="http://schemas.openxmlformats.org/markup-compatibility/2006">
-    <mc:Choice xmlns:p15="http://schemas.microsoft.com/office/powerpoint/2012/main" Requires="p15">
+  <mc:AlternateContent xmlns:mc="http://schemas.openxmlformats.org/markup-compatibility/2006" xmlns:p15="http://schemas.microsoft.com/office/powerpoint/2012/main">
+    <mc:Choice Requires="p15">
       <p:transition xmlns:p14="http://schemas.microsoft.com/office/powerpoint/2010/main" spd="slow" p14:dur="1250">
         <p15:prstTrans prst="peelOff"/>
       </p:transition>
     </mc:Choice>
-    <mc:Fallback>
+    <mc:Fallback xmlns="">
       <p:transition spd="slow">
         <p:fade/>
       </p:transition>
@@ -6959,13 +6959,13 @@
   <p:clrMapOvr>
     <a:masterClrMapping/>
   </p:clrMapOvr>
-  <mc:AlternateContent xmlns:mc="http://schemas.openxmlformats.org/markup-compatibility/2006">
-    <mc:Choice xmlns:p15="http://schemas.microsoft.com/office/powerpoint/2012/main" Requires="p15">
+  <mc:AlternateContent xmlns:mc="http://schemas.openxmlformats.org/markup-compatibility/2006" xmlns:p15="http://schemas.microsoft.com/office/powerpoint/2012/main">
+    <mc:Choice Requires="p15">
       <p:transition xmlns:p14="http://schemas.microsoft.com/office/powerpoint/2010/main" spd="slow" p14:dur="1250">
         <p15:prstTrans prst="peelOff"/>
       </p:transition>
     </mc:Choice>
-    <mc:Fallback>
+    <mc:Fallback xmlns="">
       <p:transition spd="slow">
         <p:fade/>
       </p:transition>
@@ -6983,9 +6983,6 @@
                     <p:cTn id="3" fill="hold">
                       <p:stCondLst>
                         <p:cond delay="indefinite"/>
-                        <p:cond evt="onBegin" delay="0">
-                          <p:tn val="2"/>
-                        </p:cond>
                       </p:stCondLst>
                       <p:childTnLst>
                         <p:par>
@@ -6995,7 +6992,7 @@
                             </p:stCondLst>
                             <p:childTnLst>
                               <p:par>
-                                <p:cTn id="5" presetID="10" presetClass="entr" presetSubtype="0" fill="hold" nodeType="afterEffect">
+                                <p:cTn id="5" presetID="10" presetClass="entr" presetSubtype="0" fill="hold" nodeType="clickEffect">
                                   <p:stCondLst>
                                     <p:cond delay="0"/>
                                   </p:stCondLst>
@@ -7032,27 +7029,36 @@
                             </p:childTnLst>
                           </p:cTn>
                         </p:par>
+                      </p:childTnLst>
+                    </p:cTn>
+                  </p:par>
+                  <p:par>
+                    <p:cTn id="8" fill="hold">
+                      <p:stCondLst>
+                        <p:cond delay="indefinite"/>
+                      </p:stCondLst>
+                      <p:childTnLst>
                         <p:par>
-                          <p:cTn id="8" fill="hold">
+                          <p:cTn id="9" fill="hold">
                             <p:stCondLst>
-                              <p:cond delay="500"/>
+                              <p:cond delay="0"/>
                             </p:stCondLst>
                             <p:childTnLst>
                               <p:par>
-                                <p:cTn id="9" presetID="10" presetClass="entr" presetSubtype="0" fill="hold" grpId="0" nodeType="afterEffect">
+                                <p:cTn id="10" presetID="10" presetClass="entr" presetSubtype="0" fill="hold" nodeType="clickEffect">
                                   <p:stCondLst>
                                     <p:cond delay="0"/>
                                   </p:stCondLst>
                                   <p:childTnLst>
                                     <p:set>
                                       <p:cBhvr>
-                                        <p:cTn id="10" dur="1" fill="hold">
+                                        <p:cTn id="11" dur="1" fill="hold">
                                           <p:stCondLst>
                                             <p:cond delay="0"/>
                                           </p:stCondLst>
                                         </p:cTn>
                                         <p:tgtEl>
-                                          <p:spTgt spid="16"/>
+                                          <p:spTgt spid="24"/>
                                         </p:tgtEl>
                                         <p:attrNameLst>
                                           <p:attrName>style.visibility</p:attrName>
@@ -7064,26 +7070,17 @@
                                     </p:set>
                                     <p:animEffect transition="in" filter="fade">
                                       <p:cBhvr>
-                                        <p:cTn id="11" dur="500"/>
-                                        <p:tgtEl>
-                                          <p:spTgt spid="16"/>
+                                        <p:cTn id="12" dur="500"/>
+                                        <p:tgtEl>
+                                          <p:spTgt spid="24"/>
                                         </p:tgtEl>
                                       </p:cBhvr>
                                     </p:animEffect>
                                   </p:childTnLst>
                                 </p:cTn>
                               </p:par>
-                            </p:childTnLst>
-                          </p:cTn>
-                        </p:par>
-                        <p:par>
-                          <p:cTn id="12" fill="hold">
-                            <p:stCondLst>
-                              <p:cond delay="1000"/>
-                            </p:stCondLst>
-                            <p:childTnLst>
                               <p:par>
-                                <p:cTn id="13" presetID="10" presetClass="entr" presetSubtype="0" fill="hold" nodeType="afterEffect">
+                                <p:cTn id="13" presetID="10" presetClass="entr" presetSubtype="0" fill="hold" grpId="0" nodeType="withEffect">
                                   <p:stCondLst>
                                     <p:cond delay="0"/>
                                   </p:stCondLst>
@@ -7096,7 +7093,7 @@
                                           </p:stCondLst>
                                         </p:cTn>
                                         <p:tgtEl>
-                                          <p:spTgt spid="24"/>
+                                          <p:spTgt spid="16"/>
                                         </p:tgtEl>
                                         <p:attrNameLst>
                                           <p:attrName>style.visibility</p:attrName>
@@ -7110,7 +7107,7 @@
                                       <p:cBhvr>
                                         <p:cTn id="15" dur="500"/>
                                         <p:tgtEl>
-                                          <p:spTgt spid="24"/>
+                                          <p:spTgt spid="16"/>
                                         </p:tgtEl>
                                       </p:cBhvr>
                                     </p:animEffect>
@@ -7120,27 +7117,36 @@
                             </p:childTnLst>
                           </p:cTn>
                         </p:par>
+                      </p:childTnLst>
+                    </p:cTn>
+                  </p:par>
+                  <p:par>
+                    <p:cTn id="16" fill="hold">
+                      <p:stCondLst>
+                        <p:cond delay="indefinite"/>
+                      </p:stCondLst>
+                      <p:childTnLst>
                         <p:par>
-                          <p:cTn id="16" fill="hold">
+                          <p:cTn id="17" fill="hold">
                             <p:stCondLst>
-                              <p:cond delay="1500"/>
+                              <p:cond delay="0"/>
                             </p:stCondLst>
                             <p:childTnLst>
                               <p:par>
-                                <p:cTn id="17" presetID="10" presetClass="entr" presetSubtype="0" fill="hold" grpId="0" nodeType="afterEffect">
+                                <p:cTn id="18" presetID="10" presetClass="entr" presetSubtype="0" fill="hold" nodeType="clickEffect">
                                   <p:stCondLst>
                                     <p:cond delay="0"/>
                                   </p:stCondLst>
                                   <p:childTnLst>
                                     <p:set>
                                       <p:cBhvr>
-                                        <p:cTn id="18" dur="1" fill="hold">
+                                        <p:cTn id="19" dur="1" fill="hold">
                                           <p:stCondLst>
                                             <p:cond delay="0"/>
                                           </p:stCondLst>
                                         </p:cTn>
                                         <p:tgtEl>
-                                          <p:spTgt spid="25"/>
+                                          <p:spTgt spid="22"/>
                                         </p:tgtEl>
                                         <p:attrNameLst>
                                           <p:attrName>style.visibility</p:attrName>
@@ -7152,26 +7158,17 @@
                                     </p:set>
                                     <p:animEffect transition="in" filter="fade">
                                       <p:cBhvr>
-                                        <p:cTn id="19" dur="500"/>
-                                        <p:tgtEl>
-                                          <p:spTgt spid="25"/>
+                                        <p:cTn id="20" dur="500"/>
+                                        <p:tgtEl>
+                                          <p:spTgt spid="22"/>
                                         </p:tgtEl>
                                       </p:cBhvr>
                                     </p:animEffect>
                                   </p:childTnLst>
                                 </p:cTn>
                               </p:par>
-                            </p:childTnLst>
-                          </p:cTn>
-                        </p:par>
-                        <p:par>
-                          <p:cTn id="20" fill="hold">
-                            <p:stCondLst>
-                              <p:cond delay="2000"/>
-                            </p:stCondLst>
-                            <p:childTnLst>
                               <p:par>
-                                <p:cTn id="21" presetID="10" presetClass="entr" presetSubtype="0" fill="hold" nodeType="afterEffect">
+                                <p:cTn id="21" presetID="10" presetClass="entr" presetSubtype="0" fill="hold" grpId="0" nodeType="withEffect">
                                   <p:stCondLst>
                                     <p:cond delay="0"/>
                                   </p:stCondLst>
@@ -7184,7 +7181,7 @@
                                           </p:stCondLst>
                                         </p:cTn>
                                         <p:tgtEl>
-                                          <p:spTgt spid="22"/>
+                                          <p:spTgt spid="25"/>
                                         </p:tgtEl>
                                         <p:attrNameLst>
                                           <p:attrName>style.visibility</p:attrName>
@@ -7198,7 +7195,7 @@
                                       <p:cBhvr>
                                         <p:cTn id="23" dur="500"/>
                                         <p:tgtEl>
-                                          <p:spTgt spid="22"/>
+                                          <p:spTgt spid="25"/>
                                         </p:tgtEl>
                                       </p:cBhvr>
                                     </p:animEffect>
@@ -7208,27 +7205,36 @@
                             </p:childTnLst>
                           </p:cTn>
                         </p:par>
+                      </p:childTnLst>
+                    </p:cTn>
+                  </p:par>
+                  <p:par>
+                    <p:cTn id="24" fill="hold">
+                      <p:stCondLst>
+                        <p:cond delay="indefinite"/>
+                      </p:stCondLst>
+                      <p:childTnLst>
                         <p:par>
-                          <p:cTn id="24" fill="hold">
+                          <p:cTn id="25" fill="hold">
                             <p:stCondLst>
-                              <p:cond delay="2500"/>
+                              <p:cond delay="0"/>
                             </p:stCondLst>
                             <p:childTnLst>
                               <p:par>
-                                <p:cTn id="25" presetID="10" presetClass="entr" presetSubtype="0" fill="hold" grpId="0" nodeType="afterEffect">
+                                <p:cTn id="26" presetID="10" presetClass="entr" presetSubtype="0" fill="hold" nodeType="clickEffect">
                                   <p:stCondLst>
                                     <p:cond delay="0"/>
                                   </p:stCondLst>
                                   <p:childTnLst>
                                     <p:set>
                                       <p:cBhvr>
-                                        <p:cTn id="26" dur="1" fill="hold">
+                                        <p:cTn id="27" dur="1" fill="hold">
                                           <p:stCondLst>
                                             <p:cond delay="0"/>
                                           </p:stCondLst>
                                         </p:cTn>
                                         <p:tgtEl>
-                                          <p:spTgt spid="31"/>
+                                          <p:spTgt spid="34"/>
                                         </p:tgtEl>
                                         <p:attrNameLst>
                                           <p:attrName>style.visibility</p:attrName>
@@ -7240,26 +7246,17 @@
                                     </p:set>
                                     <p:animEffect transition="in" filter="fade">
                                       <p:cBhvr>
-                                        <p:cTn id="27" dur="500"/>
-                                        <p:tgtEl>
-                                          <p:spTgt spid="31"/>
+                                        <p:cTn id="28" dur="500"/>
+                                        <p:tgtEl>
+                                          <p:spTgt spid="34"/>
                                         </p:tgtEl>
                                       </p:cBhvr>
                                     </p:animEffect>
                                   </p:childTnLst>
                                 </p:cTn>
                               </p:par>
-                            </p:childTnLst>
-                          </p:cTn>
-                        </p:par>
-                        <p:par>
-                          <p:cTn id="28" fill="hold">
-                            <p:stCondLst>
-                              <p:cond delay="3000"/>
-                            </p:stCondLst>
-                            <p:childTnLst>
                               <p:par>
-                                <p:cTn id="29" presetID="10" presetClass="entr" presetSubtype="0" fill="hold" nodeType="afterEffect">
+                                <p:cTn id="29" presetID="10" presetClass="entr" presetSubtype="0" fill="hold" grpId="0" nodeType="withEffect">
                                   <p:stCondLst>
                                     <p:cond delay="0"/>
                                   </p:stCondLst>
@@ -7272,7 +7269,7 @@
                                           </p:stCondLst>
                                         </p:cTn>
                                         <p:tgtEl>
-                                          <p:spTgt spid="34"/>
+                                          <p:spTgt spid="31"/>
                                         </p:tgtEl>
                                         <p:attrNameLst>
                                           <p:attrName>style.visibility</p:attrName>
@@ -7286,7 +7283,7 @@
                                       <p:cBhvr>
                                         <p:cTn id="31" dur="500"/>
                                         <p:tgtEl>
-                                          <p:spTgt spid="34"/>
+                                          <p:spTgt spid="31"/>
                                         </p:tgtEl>
                                       </p:cBhvr>
                                     </p:animEffect>
@@ -7296,27 +7293,36 @@
                             </p:childTnLst>
                           </p:cTn>
                         </p:par>
+                      </p:childTnLst>
+                    </p:cTn>
+                  </p:par>
+                  <p:par>
+                    <p:cTn id="32" fill="hold">
+                      <p:stCondLst>
+                        <p:cond delay="indefinite"/>
+                      </p:stCondLst>
+                      <p:childTnLst>
                         <p:par>
-                          <p:cTn id="32" fill="hold">
+                          <p:cTn id="33" fill="hold">
                             <p:stCondLst>
-                              <p:cond delay="3500"/>
+                              <p:cond delay="0"/>
                             </p:stCondLst>
                             <p:childTnLst>
                               <p:par>
-                                <p:cTn id="33" presetID="10" presetClass="entr" presetSubtype="0" fill="hold" grpId="0" nodeType="afterEffect">
+                                <p:cTn id="34" presetID="10" presetClass="entr" presetSubtype="0" fill="hold" nodeType="clickEffect">
                                   <p:stCondLst>
                                     <p:cond delay="0"/>
                                   </p:stCondLst>
                                   <p:childTnLst>
                                     <p:set>
                                       <p:cBhvr>
-                                        <p:cTn id="34" dur="1" fill="hold">
+                                        <p:cTn id="35" dur="1" fill="hold">
                                           <p:stCondLst>
                                             <p:cond delay="0"/>
                                           </p:stCondLst>
                                         </p:cTn>
                                         <p:tgtEl>
-                                          <p:spTgt spid="40"/>
+                                          <p:spTgt spid="35"/>
                                         </p:tgtEl>
                                         <p:attrNameLst>
                                           <p:attrName>style.visibility</p:attrName>
@@ -7328,26 +7334,17 @@
                                     </p:set>
                                     <p:animEffect transition="in" filter="fade">
                                       <p:cBhvr>
-                                        <p:cTn id="35" dur="500"/>
-                                        <p:tgtEl>
-                                          <p:spTgt spid="40"/>
+                                        <p:cTn id="36" dur="500"/>
+                                        <p:tgtEl>
+                                          <p:spTgt spid="35"/>
                                         </p:tgtEl>
                                       </p:cBhvr>
                                     </p:animEffect>
                                   </p:childTnLst>
                                 </p:cTn>
                               </p:par>
-                            </p:childTnLst>
-                          </p:cTn>
-                        </p:par>
-                        <p:par>
-                          <p:cTn id="36" fill="hold">
-                            <p:stCondLst>
-                              <p:cond delay="4000"/>
-                            </p:stCondLst>
-                            <p:childTnLst>
                               <p:par>
-                                <p:cTn id="37" presetID="10" presetClass="entr" presetSubtype="0" fill="hold" nodeType="afterEffect">
+                                <p:cTn id="37" presetID="10" presetClass="entr" presetSubtype="0" fill="hold" grpId="0" nodeType="withEffect">
                                   <p:stCondLst>
                                     <p:cond delay="0"/>
                                   </p:stCondLst>
@@ -7360,7 +7357,7 @@
                                           </p:stCondLst>
                                         </p:cTn>
                                         <p:tgtEl>
-                                          <p:spTgt spid="35"/>
+                                          <p:spTgt spid="40"/>
                                         </p:tgtEl>
                                         <p:attrNameLst>
                                           <p:attrName>style.visibility</p:attrName>
@@ -7374,7 +7371,7 @@
                                       <p:cBhvr>
                                         <p:cTn id="39" dur="500"/>
                                         <p:tgtEl>
-                                          <p:spTgt spid="35"/>
+                                          <p:spTgt spid="40"/>
                                         </p:tgtEl>
                                       </p:cBhvr>
                                     </p:animEffect>
@@ -7756,13 +7753,13 @@
   <p:clrMapOvr>
     <a:masterClrMapping/>
   </p:clrMapOvr>
-  <mc:AlternateContent xmlns:mc="http://schemas.openxmlformats.org/markup-compatibility/2006">
-    <mc:Choice xmlns:p15="http://schemas.microsoft.com/office/powerpoint/2012/main" Requires="p15">
+  <mc:AlternateContent xmlns:mc="http://schemas.openxmlformats.org/markup-compatibility/2006" xmlns:p15="http://schemas.microsoft.com/office/powerpoint/2012/main">
+    <mc:Choice Requires="p15">
       <p:transition xmlns:p14="http://schemas.microsoft.com/office/powerpoint/2010/main" spd="slow" p14:dur="1250">
         <p15:prstTrans prst="peelOff"/>
       </p:transition>
     </mc:Choice>
-    <mc:Fallback>
+    <mc:Fallback xmlns="">
       <p:transition spd="slow">
         <p:fade/>
       </p:transition>
@@ -8225,13 +8222,13 @@
   <p:clrMapOvr>
     <a:masterClrMapping/>
   </p:clrMapOvr>
-  <mc:AlternateContent xmlns:mc="http://schemas.openxmlformats.org/markup-compatibility/2006">
-    <mc:Choice xmlns:p15="http://schemas.microsoft.com/office/powerpoint/2012/main" Requires="p15">
+  <mc:AlternateContent xmlns:mc="http://schemas.openxmlformats.org/markup-compatibility/2006" xmlns:p15="http://schemas.microsoft.com/office/powerpoint/2012/main">
+    <mc:Choice Requires="p15">
       <p:transition xmlns:p14="http://schemas.microsoft.com/office/powerpoint/2010/main" spd="slow" p14:dur="1250">
         <p15:prstTrans prst="peelOff"/>
       </p:transition>
     </mc:Choice>
-    <mc:Fallback>
+    <mc:Fallback xmlns="">
       <p:transition spd="slow">
         <p:fade/>
       </p:transition>
@@ -9042,13 +9039,13 @@
   <p:clrMapOvr>
     <a:masterClrMapping/>
   </p:clrMapOvr>
-  <mc:AlternateContent xmlns:mc="http://schemas.openxmlformats.org/markup-compatibility/2006">
-    <mc:Choice xmlns:p15="http://schemas.microsoft.com/office/powerpoint/2012/main" Requires="p15">
+  <mc:AlternateContent xmlns:mc="http://schemas.openxmlformats.org/markup-compatibility/2006" xmlns:p15="http://schemas.microsoft.com/office/powerpoint/2012/main">
+    <mc:Choice Requires="p15">
       <p:transition xmlns:p14="http://schemas.microsoft.com/office/powerpoint/2010/main" spd="slow" p14:dur="1250">
         <p15:prstTrans prst="peelOff"/>
       </p:transition>
     </mc:Choice>
-    <mc:Fallback>
+    <mc:Fallback xmlns="">
       <p:transition spd="slow">
         <p:fade/>
       </p:transition>
@@ -9750,13 +9747,13 @@
   <p:clrMapOvr>
     <a:masterClrMapping/>
   </p:clrMapOvr>
-  <mc:AlternateContent xmlns:mc="http://schemas.openxmlformats.org/markup-compatibility/2006">
-    <mc:Choice xmlns:p15="http://schemas.microsoft.com/office/powerpoint/2012/main" Requires="p15">
+  <mc:AlternateContent xmlns:mc="http://schemas.openxmlformats.org/markup-compatibility/2006" xmlns:p15="http://schemas.microsoft.com/office/powerpoint/2012/main">
+    <mc:Choice Requires="p15">
       <p:transition xmlns:p14="http://schemas.microsoft.com/office/powerpoint/2010/main" spd="slow" p14:dur="1250">
         <p15:prstTrans prst="peelOff"/>
       </p:transition>
     </mc:Choice>
-    <mc:Fallback>
+    <mc:Fallback xmlns="">
       <p:transition spd="slow">
         <p:fade/>
       </p:transition>
@@ -11022,13 +11019,13 @@
   <p:clrMapOvr>
     <a:masterClrMapping/>
   </p:clrMapOvr>
-  <mc:AlternateContent xmlns:mc="http://schemas.openxmlformats.org/markup-compatibility/2006">
-    <mc:Choice xmlns:p15="http://schemas.microsoft.com/office/powerpoint/2012/main" Requires="p15">
+  <mc:AlternateContent xmlns:mc="http://schemas.openxmlformats.org/markup-compatibility/2006" xmlns:p15="http://schemas.microsoft.com/office/powerpoint/2012/main">
+    <mc:Choice Requires="p15">
       <p:transition xmlns:p14="http://schemas.microsoft.com/office/powerpoint/2010/main" spd="slow" p14:dur="1250">
         <p15:prstTrans prst="peelOff"/>
       </p:transition>
     </mc:Choice>
-    <mc:Fallback>
+    <mc:Fallback xmlns="">
       <p:transition spd="slow">
         <p:fade/>
       </p:transition>
@@ -11765,13 +11762,13 @@
   <p:clrMapOvr>
     <a:masterClrMapping/>
   </p:clrMapOvr>
-  <mc:AlternateContent xmlns:mc="http://schemas.openxmlformats.org/markup-compatibility/2006">
-    <mc:Choice xmlns:p15="http://schemas.microsoft.com/office/powerpoint/2012/main" Requires="p15">
+  <mc:AlternateContent xmlns:mc="http://schemas.openxmlformats.org/markup-compatibility/2006" xmlns:p15="http://schemas.microsoft.com/office/powerpoint/2012/main">
+    <mc:Choice Requires="p15">
       <p:transition xmlns:p14="http://schemas.microsoft.com/office/powerpoint/2010/main" spd="slow" p14:dur="1250">
         <p15:prstTrans prst="peelOff"/>
       </p:transition>
     </mc:Choice>
-    <mc:Fallback>
+    <mc:Fallback xmlns="">
       <p:transition spd="slow">
         <p:fade/>
       </p:transition>
@@ -12489,13 +12486,13 @@
   <p:clrMapOvr>
     <a:masterClrMapping/>
   </p:clrMapOvr>
-  <mc:AlternateContent xmlns:mc="http://schemas.openxmlformats.org/markup-compatibility/2006">
-    <mc:Choice xmlns:p15="http://schemas.microsoft.com/office/powerpoint/2012/main" Requires="p15">
+  <mc:AlternateContent xmlns:mc="http://schemas.openxmlformats.org/markup-compatibility/2006" xmlns:p15="http://schemas.microsoft.com/office/powerpoint/2012/main">
+    <mc:Choice Requires="p15">
       <p:transition xmlns:p14="http://schemas.microsoft.com/office/powerpoint/2010/main" spd="slow" p14:dur="1250">
         <p15:prstTrans prst="peelOff"/>
       </p:transition>
     </mc:Choice>
-    <mc:Fallback>
+    <mc:Fallback xmlns="">
       <p:transition spd="slow">
         <p:fade/>
       </p:transition>
@@ -12807,13 +12804,13 @@
   <p:clrMapOvr>
     <a:masterClrMapping/>
   </p:clrMapOvr>
-  <mc:AlternateContent xmlns:mc="http://schemas.openxmlformats.org/markup-compatibility/2006">
-    <mc:Choice xmlns:p15="http://schemas.microsoft.com/office/powerpoint/2012/main" Requires="p15">
+  <mc:AlternateContent xmlns:mc="http://schemas.openxmlformats.org/markup-compatibility/2006" xmlns:p15="http://schemas.microsoft.com/office/powerpoint/2012/main">
+    <mc:Choice Requires="p15">
       <p:transition xmlns:p14="http://schemas.microsoft.com/office/powerpoint/2010/main" spd="slow" p14:dur="1250">
         <p15:prstTrans prst="peelOff"/>
       </p:transition>
     </mc:Choice>
-    <mc:Fallback>
+    <mc:Fallback xmlns="">
       <p:transition spd="slow">
         <p:fade/>
       </p:transition>
@@ -13173,13 +13170,13 @@
   <p:clrMapOvr>
     <a:masterClrMapping/>
   </p:clrMapOvr>
-  <mc:AlternateContent xmlns:mc="http://schemas.openxmlformats.org/markup-compatibility/2006">
-    <mc:Choice xmlns:p15="http://schemas.microsoft.com/office/powerpoint/2012/main" Requires="p15">
+  <mc:AlternateContent xmlns:mc="http://schemas.openxmlformats.org/markup-compatibility/2006" xmlns:p15="http://schemas.microsoft.com/office/powerpoint/2012/main">
+    <mc:Choice Requires="p15">
       <p:transition xmlns:p14="http://schemas.microsoft.com/office/powerpoint/2010/main" spd="slow" p14:dur="1250">
         <p15:prstTrans prst="peelOff"/>
       </p:transition>
     </mc:Choice>
-    <mc:Fallback>
+    <mc:Fallback xmlns="">
       <p:transition spd="slow">
         <p:fade/>
       </p:transition>
@@ -13583,13 +13580,13 @@
   <p:clrMapOvr>
     <a:masterClrMapping/>
   </p:clrMapOvr>
-  <mc:AlternateContent xmlns:mc="http://schemas.openxmlformats.org/markup-compatibility/2006">
-    <mc:Choice xmlns:p15="http://schemas.microsoft.com/office/powerpoint/2012/main" Requires="p15">
+  <mc:AlternateContent xmlns:mc="http://schemas.openxmlformats.org/markup-compatibility/2006" xmlns:p15="http://schemas.microsoft.com/office/powerpoint/2012/main">
+    <mc:Choice Requires="p15">
       <p:transition xmlns:p14="http://schemas.microsoft.com/office/powerpoint/2010/main" spd="slow" p14:dur="1250">
         <p15:prstTrans prst="peelOff"/>
       </p:transition>
     </mc:Choice>
-    <mc:Fallback>
+    <mc:Fallback xmlns="">
       <p:transition spd="slow">
         <p:fade/>
       </p:transition>
@@ -14142,13 +14139,13 @@
   <p:clrMapOvr>
     <a:masterClrMapping/>
   </p:clrMapOvr>
-  <mc:AlternateContent xmlns:mc="http://schemas.openxmlformats.org/markup-compatibility/2006">
-    <mc:Choice xmlns:p15="http://schemas.microsoft.com/office/powerpoint/2012/main" Requires="p15">
+  <mc:AlternateContent xmlns:mc="http://schemas.openxmlformats.org/markup-compatibility/2006" xmlns:p15="http://schemas.microsoft.com/office/powerpoint/2012/main">
+    <mc:Choice Requires="p15">
       <p:transition xmlns:p14="http://schemas.microsoft.com/office/powerpoint/2010/main" spd="slow" p14:dur="1250">
         <p15:prstTrans prst="peelOff"/>
       </p:transition>
     </mc:Choice>
-    <mc:Fallback>
+    <mc:Fallback xmlns="">
       <p:transition spd="slow">
         <p:fade/>
       </p:transition>
@@ -15198,13 +15195,13 @@
   <p:clrMapOvr>
     <a:masterClrMapping/>
   </p:clrMapOvr>
-  <mc:AlternateContent xmlns:mc="http://schemas.openxmlformats.org/markup-compatibility/2006">
-    <mc:Choice xmlns:p15="http://schemas.microsoft.com/office/powerpoint/2012/main" Requires="p15">
+  <mc:AlternateContent xmlns:mc="http://schemas.openxmlformats.org/markup-compatibility/2006" xmlns:p15="http://schemas.microsoft.com/office/powerpoint/2012/main">
+    <mc:Choice Requires="p15">
       <p:transition xmlns:p14="http://schemas.microsoft.com/office/powerpoint/2010/main" spd="slow" p14:dur="1250">
         <p15:prstTrans prst="peelOff"/>
       </p:transition>
     </mc:Choice>
-    <mc:Fallback>
+    <mc:Fallback xmlns="">
       <p:transition spd="slow">
         <p:fade/>
       </p:transition>
@@ -16095,13 +16092,13 @@
   <p:clrMapOvr>
     <a:masterClrMapping/>
   </p:clrMapOvr>
-  <mc:AlternateContent xmlns:mc="http://schemas.openxmlformats.org/markup-compatibility/2006">
-    <mc:Choice xmlns:p15="http://schemas.microsoft.com/office/powerpoint/2012/main" Requires="p15">
+  <mc:AlternateContent xmlns:mc="http://schemas.openxmlformats.org/markup-compatibility/2006" xmlns:p15="http://schemas.microsoft.com/office/powerpoint/2012/main">
+    <mc:Choice Requires="p15">
       <p:transition xmlns:p14="http://schemas.microsoft.com/office/powerpoint/2010/main" spd="slow" p14:dur="1250">
         <p15:prstTrans prst="peelOff"/>
       </p:transition>
     </mc:Choice>
-    <mc:Fallback>
+    <mc:Fallback xmlns="">
       <p:transition spd="slow">
         <p:fade/>
       </p:transition>
@@ -16743,13 +16740,13 @@
   <p:clrMapOvr>
     <a:masterClrMapping/>
   </p:clrMapOvr>
-  <mc:AlternateContent xmlns:mc="http://schemas.openxmlformats.org/markup-compatibility/2006">
-    <mc:Choice xmlns:p15="http://schemas.microsoft.com/office/powerpoint/2012/main" Requires="p15">
+  <mc:AlternateContent xmlns:mc="http://schemas.openxmlformats.org/markup-compatibility/2006" xmlns:p15="http://schemas.microsoft.com/office/powerpoint/2012/main">
+    <mc:Choice Requires="p15">
       <p:transition xmlns:p14="http://schemas.microsoft.com/office/powerpoint/2010/main" spd="slow" p14:dur="1250">
         <p15:prstTrans prst="peelOff"/>
       </p:transition>
     </mc:Choice>
-    <mc:Fallback>
+    <mc:Fallback xmlns="">
       <p:transition spd="slow">
         <p:fade/>
       </p:transition>
@@ -17604,13 +17601,13 @@
   <p:clrMapOvr>
     <a:masterClrMapping/>
   </p:clrMapOvr>
-  <mc:AlternateContent xmlns:mc="http://schemas.openxmlformats.org/markup-compatibility/2006">
-    <mc:Choice xmlns:p15="http://schemas.microsoft.com/office/powerpoint/2012/main" Requires="p15">
+  <mc:AlternateContent xmlns:mc="http://schemas.openxmlformats.org/markup-compatibility/2006" xmlns:p15="http://schemas.microsoft.com/office/powerpoint/2012/main">
+    <mc:Choice Requires="p15">
       <p:transition xmlns:p14="http://schemas.microsoft.com/office/powerpoint/2010/main" spd="slow" p14:dur="1250">
         <p15:prstTrans prst="peelOff"/>
       </p:transition>
     </mc:Choice>
-    <mc:Fallback>
+    <mc:Fallback xmlns="">
       <p:transition spd="slow">
         <p:fade/>
       </p:transition>
@@ -18245,13 +18242,13 @@
   <p:clrMapOvr>
     <a:masterClrMapping/>
   </p:clrMapOvr>
-  <mc:AlternateContent xmlns:mc="http://schemas.openxmlformats.org/markup-compatibility/2006">
-    <mc:Choice xmlns:p15="http://schemas.microsoft.com/office/powerpoint/2012/main" Requires="p15">
+  <mc:AlternateContent xmlns:mc="http://schemas.openxmlformats.org/markup-compatibility/2006" xmlns:p15="http://schemas.microsoft.com/office/powerpoint/2012/main">
+    <mc:Choice Requires="p15">
       <p:transition xmlns:p14="http://schemas.microsoft.com/office/powerpoint/2010/main" spd="slow" p14:dur="1250">
         <p15:prstTrans prst="peelOff"/>
       </p:transition>
     </mc:Choice>
-    <mc:Fallback>
+    <mc:Fallback xmlns="">
       <p:transition spd="slow">
         <p:fade/>
       </p:transition>
@@ -18353,33 +18350,15 @@
                                   </p:childTnLst>
                                 </p:cTn>
                               </p:par>
-                            </p:childTnLst>
-                          </p:cTn>
-                        </p:par>
-                      </p:childTnLst>
-                    </p:cTn>
-                  </p:par>
-                  <p:par>
-                    <p:cTn id="9" fill="hold">
-                      <p:stCondLst>
-                        <p:cond delay="indefinite"/>
-                      </p:stCondLst>
-                      <p:childTnLst>
-                        <p:par>
-                          <p:cTn id="10" fill="hold">
-                            <p:stCondLst>
-                              <p:cond delay="0"/>
-                            </p:stCondLst>
-                            <p:childTnLst>
                               <p:par>
-                                <p:cTn id="11" presetID="2" presetClass="entr" presetSubtype="2" fill="hold" grpId="0" nodeType="clickEffect">
+                                <p:cTn id="9" presetID="2" presetClass="entr" presetSubtype="2" fill="hold" grpId="0" nodeType="withEffect">
                                   <p:stCondLst>
                                     <p:cond delay="0"/>
                                   </p:stCondLst>
                                   <p:childTnLst>
                                     <p:set>
                                       <p:cBhvr>
-                                        <p:cTn id="12" dur="1" fill="hold">
+                                        <p:cTn id="10" dur="1" fill="hold">
                                           <p:stCondLst>
                                             <p:cond delay="0"/>
                                           </p:stCondLst>
@@ -18397,7 +18376,7 @@
                                     </p:set>
                                     <p:anim calcmode="lin" valueType="num">
                                       <p:cBhvr additive="base">
-                                        <p:cTn id="13" dur="500" fill="hold"/>
+                                        <p:cTn id="11" dur="500" fill="hold"/>
                                         <p:tgtEl>
                                           <p:spTgt spid="11"/>
                                         </p:tgtEl>
@@ -18420,7 +18399,7 @@
                                     </p:anim>
                                     <p:anim calcmode="lin" valueType="num">
                                       <p:cBhvr additive="base">
-                                        <p:cTn id="14" dur="500" fill="hold"/>
+                                        <p:cTn id="12" dur="500" fill="hold"/>
                                         <p:tgtEl>
                                           <p:spTgt spid="11"/>
                                         </p:tgtEl>
@@ -18445,14 +18424,14 @@
                                 </p:cTn>
                               </p:par>
                               <p:par>
-                                <p:cTn id="15" presetID="2" presetClass="entr" presetSubtype="2" fill="hold" grpId="0" nodeType="withEffect">
+                                <p:cTn id="13" presetID="2" presetClass="entr" presetSubtype="2" fill="hold" grpId="0" nodeType="withEffect">
                                   <p:stCondLst>
                                     <p:cond delay="0"/>
                                   </p:stCondLst>
                                   <p:childTnLst>
                                     <p:set>
                                       <p:cBhvr>
-                                        <p:cTn id="16" dur="1" fill="hold">
+                                        <p:cTn id="14" dur="1" fill="hold">
                                           <p:stCondLst>
                                             <p:cond delay="0"/>
                                           </p:stCondLst>
@@ -18470,7 +18449,7 @@
                                     </p:set>
                                     <p:anim calcmode="lin" valueType="num">
                                       <p:cBhvr additive="base">
-                                        <p:cTn id="17" dur="500" fill="hold"/>
+                                        <p:cTn id="15" dur="500" fill="hold"/>
                                         <p:tgtEl>
                                           <p:spTgt spid="12"/>
                                         </p:tgtEl>
@@ -18493,7 +18472,7 @@
                                     </p:anim>
                                     <p:anim calcmode="lin" valueType="num">
                                       <p:cBhvr additive="base">
-                                        <p:cTn id="18" dur="500" fill="hold"/>
+                                        <p:cTn id="16" dur="500" fill="hold"/>
                                         <p:tgtEl>
                                           <p:spTgt spid="12"/>
                                         </p:tgtEl>
@@ -18518,20 +18497,20 @@
                                 </p:cTn>
                               </p:par>
                               <p:par>
-                                <p:cTn id="19" presetID="2" presetClass="entr" presetSubtype="2" fill="hold" grpId="0" nodeType="withEffect">
+                                <p:cTn id="17" presetID="2" presetClass="entr" presetSubtype="2" fill="hold" grpId="0" nodeType="withEffect">
                                   <p:stCondLst>
                                     <p:cond delay="0"/>
                                   </p:stCondLst>
                                   <p:childTnLst>
                                     <p:set>
                                       <p:cBhvr>
-                                        <p:cTn id="20" dur="1" fill="hold">
+                                        <p:cTn id="18" dur="1" fill="hold">
                                           <p:stCondLst>
                                             <p:cond delay="0"/>
                                           </p:stCondLst>
                                         </p:cTn>
                                         <p:tgtEl>
-                                          <p:spTgt spid="16"/>
+                                          <p:spTgt spid="13"/>
                                         </p:tgtEl>
                                         <p:attrNameLst>
                                           <p:attrName>style.visibility</p:attrName>
@@ -18543,9 +18522,9 @@
                                     </p:set>
                                     <p:anim calcmode="lin" valueType="num">
                                       <p:cBhvr additive="base">
-                                        <p:cTn id="21" dur="500" fill="hold"/>
-                                        <p:tgtEl>
-                                          <p:spTgt spid="16"/>
+                                        <p:cTn id="19" dur="500" fill="hold"/>
+                                        <p:tgtEl>
+                                          <p:spTgt spid="13"/>
                                         </p:tgtEl>
                                         <p:attrNameLst>
                                           <p:attrName>ppt_x</p:attrName>
@@ -18566,9 +18545,9 @@
                                     </p:anim>
                                     <p:anim calcmode="lin" valueType="num">
                                       <p:cBhvr additive="base">
-                                        <p:cTn id="22" dur="500" fill="hold"/>
-                                        <p:tgtEl>
-                                          <p:spTgt spid="16"/>
+                                        <p:cTn id="20" dur="500" fill="hold"/>
+                                        <p:tgtEl>
+                                          <p:spTgt spid="13"/>
                                         </p:tgtEl>
                                         <p:attrNameLst>
                                           <p:attrName>ppt_y</p:attrName>
@@ -18591,20 +18570,20 @@
                                 </p:cTn>
                               </p:par>
                               <p:par>
-                                <p:cTn id="23" presetID="2" presetClass="entr" presetSubtype="2" fill="hold" grpId="0" nodeType="withEffect">
+                                <p:cTn id="21" presetID="2" presetClass="entr" presetSubtype="2" fill="hold" grpId="0" nodeType="withEffect">
                                   <p:stCondLst>
                                     <p:cond delay="0"/>
                                   </p:stCondLst>
                                   <p:childTnLst>
                                     <p:set>
                                       <p:cBhvr>
-                                        <p:cTn id="24" dur="1" fill="hold">
+                                        <p:cTn id="22" dur="1" fill="hold">
                                           <p:stCondLst>
                                             <p:cond delay="0"/>
                                           </p:stCondLst>
                                         </p:cTn>
                                         <p:tgtEl>
-                                          <p:spTgt spid="13"/>
+                                          <p:spTgt spid="16"/>
                                         </p:tgtEl>
                                         <p:attrNameLst>
                                           <p:attrName>style.visibility</p:attrName>
@@ -18616,9 +18595,9 @@
                                     </p:set>
                                     <p:anim calcmode="lin" valueType="num">
                                       <p:cBhvr additive="base">
-                                        <p:cTn id="25" dur="500" fill="hold"/>
-                                        <p:tgtEl>
-                                          <p:spTgt spid="13"/>
+                                        <p:cTn id="23" dur="500" fill="hold"/>
+                                        <p:tgtEl>
+                                          <p:spTgt spid="16"/>
                                         </p:tgtEl>
                                         <p:attrNameLst>
                                           <p:attrName>ppt_x</p:attrName>
@@ -18639,9 +18618,9 @@
                                     </p:anim>
                                     <p:anim calcmode="lin" valueType="num">
                                       <p:cBhvr additive="base">
-                                        <p:cTn id="26" dur="500" fill="hold"/>
-                                        <p:tgtEl>
-                                          <p:spTgt spid="13"/>
+                                        <p:cTn id="24" dur="500" fill="hold"/>
+                                        <p:tgtEl>
+                                          <p:spTgt spid="16"/>
                                         </p:tgtEl>
                                         <p:attrNameLst>
                                           <p:attrName>ppt_y</p:attrName>
@@ -18667,13 +18646,13 @@
                           </p:cTn>
                         </p:par>
                         <p:par>
-                          <p:cTn id="27" fill="hold">
+                          <p:cTn id="25" fill="hold">
                             <p:stCondLst>
                               <p:cond delay="500"/>
                             </p:stCondLst>
                             <p:childTnLst>
                               <p:par>
-                                <p:cTn id="28" presetID="42" presetClass="path" presetSubtype="0" repeatCount="indefinite" accel="50000" decel="50000" autoRev="1" fill="hold" grpId="1" nodeType="afterEffect">
+                                <p:cTn id="26" presetID="42" presetClass="path" presetSubtype="0" repeatCount="indefinite" accel="50000" decel="50000" autoRev="1" fill="hold" grpId="1" nodeType="afterEffect">
                                   <p:stCondLst>
                                     <p:cond delay="0"/>
                                   </p:stCondLst>
@@ -18687,7 +18666,7 @@
                                   <p:childTnLst>
                                     <p:animMotion origin="layout" path="M 3.125E-6 -2.59259E-6 L 3.125E-6 -0.08449 " pathEditMode="relative" rAng="0" ptsTypes="AA">
                                       <p:cBhvr>
-                                        <p:cTn id="29" dur="1000" fill="hold"/>
+                                        <p:cTn id="27" dur="1000" fill="hold"/>
                                         <p:tgtEl>
                                           <p:spTgt spid="13"/>
                                         </p:tgtEl>
@@ -19011,13 +18990,13 @@
   <p:clrMapOvr>
     <a:masterClrMapping/>
   </p:clrMapOvr>
-  <mc:AlternateContent xmlns:mc="http://schemas.openxmlformats.org/markup-compatibility/2006">
-    <mc:Choice xmlns:p15="http://schemas.microsoft.com/office/powerpoint/2012/main" Requires="p15">
+  <mc:AlternateContent xmlns:mc="http://schemas.openxmlformats.org/markup-compatibility/2006" xmlns:p15="http://schemas.microsoft.com/office/powerpoint/2012/main">
+    <mc:Choice Requires="p15">
       <p:transition xmlns:p14="http://schemas.microsoft.com/office/powerpoint/2010/main" spd="slow" p14:dur="1250">
         <p15:prstTrans prst="peelOff"/>
       </p:transition>
     </mc:Choice>
-    <mc:Fallback>
+    <mc:Fallback xmlns="">
       <p:transition spd="slow">
         <p:fade/>
       </p:transition>
@@ -19984,13 +19963,13 @@
   <p:clrMapOvr>
     <a:masterClrMapping/>
   </p:clrMapOvr>
-  <mc:AlternateContent xmlns:mc="http://schemas.openxmlformats.org/markup-compatibility/2006">
-    <mc:Choice xmlns:p15="http://schemas.microsoft.com/office/powerpoint/2012/main" Requires="p15">
+  <mc:AlternateContent xmlns:mc="http://schemas.openxmlformats.org/markup-compatibility/2006" xmlns:p15="http://schemas.microsoft.com/office/powerpoint/2012/main">
+    <mc:Choice Requires="p15">
       <p:transition xmlns:p14="http://schemas.microsoft.com/office/powerpoint/2010/main" spd="slow" p14:dur="1250">
         <p15:prstTrans prst="peelOff"/>
       </p:transition>
     </mc:Choice>
-    <mc:Fallback>
+    <mc:Fallback xmlns="">
       <p:transition spd="slow">
         <p:fade/>
       </p:transition>
@@ -20806,13 +20785,13 @@
   <p:clrMapOvr>
     <a:masterClrMapping/>
   </p:clrMapOvr>
-  <mc:AlternateContent xmlns:mc="http://schemas.openxmlformats.org/markup-compatibility/2006">
-    <mc:Choice xmlns:p15="http://schemas.microsoft.com/office/powerpoint/2012/main" Requires="p15">
+  <mc:AlternateContent xmlns:mc="http://schemas.openxmlformats.org/markup-compatibility/2006" xmlns:p15="http://schemas.microsoft.com/office/powerpoint/2012/main">
+    <mc:Choice Requires="p15">
       <p:transition xmlns:p14="http://schemas.microsoft.com/office/powerpoint/2010/main" spd="slow" p14:dur="1250">
         <p15:prstTrans prst="peelOff"/>
       </p:transition>
     </mc:Choice>
-    <mc:Fallback>
+    <mc:Fallback xmlns="">
       <p:transition spd="slow">
         <p:fade/>
       </p:transition>
@@ -21277,13 +21256,13 @@
   <p:clrMapOvr>
     <a:masterClrMapping/>
   </p:clrMapOvr>
-  <mc:AlternateContent xmlns:mc="http://schemas.openxmlformats.org/markup-compatibility/2006">
-    <mc:Choice xmlns:p15="http://schemas.microsoft.com/office/powerpoint/2012/main" Requires="p15">
+  <mc:AlternateContent xmlns:mc="http://schemas.openxmlformats.org/markup-compatibility/2006" xmlns:p15="http://schemas.microsoft.com/office/powerpoint/2012/main">
+    <mc:Choice Requires="p15">
       <p:transition xmlns:p14="http://schemas.microsoft.com/office/powerpoint/2010/main" spd="slow" p14:dur="1250">
         <p15:prstTrans prst="peelOff"/>
       </p:transition>
     </mc:Choice>
-    <mc:Fallback>
+    <mc:Fallback xmlns="">
       <p:transition spd="slow">
         <p:fade/>
       </p:transition>
@@ -22055,13 +22034,13 @@
   <p:clrMapOvr>
     <a:masterClrMapping/>
   </p:clrMapOvr>
-  <mc:AlternateContent xmlns:mc="http://schemas.openxmlformats.org/markup-compatibility/2006">
-    <mc:Choice xmlns:p15="http://schemas.microsoft.com/office/powerpoint/2012/main" Requires="p15">
+  <mc:AlternateContent xmlns:mc="http://schemas.openxmlformats.org/markup-compatibility/2006" xmlns:p15="http://schemas.microsoft.com/office/powerpoint/2012/main">
+    <mc:Choice Requires="p15">
       <p:transition xmlns:p14="http://schemas.microsoft.com/office/powerpoint/2010/main" spd="slow" p14:dur="1250">
         <p15:prstTrans prst="peelOff"/>
       </p:transition>
     </mc:Choice>
-    <mc:Fallback>
+    <mc:Fallback xmlns="">
       <p:transition spd="slow">
         <p:fade/>
       </p:transition>
@@ -22459,13 +22438,13 @@
   <p:clrMapOvr>
     <a:masterClrMapping/>
   </p:clrMapOvr>
-  <mc:AlternateContent xmlns:mc="http://schemas.openxmlformats.org/markup-compatibility/2006">
-    <mc:Choice xmlns:p15="http://schemas.microsoft.com/office/powerpoint/2012/main" Requires="p15">
+  <mc:AlternateContent xmlns:mc="http://schemas.openxmlformats.org/markup-compatibility/2006" xmlns:p15="http://schemas.microsoft.com/office/powerpoint/2012/main">
+    <mc:Choice Requires="p15">
       <p:transition xmlns:p14="http://schemas.microsoft.com/office/powerpoint/2010/main" spd="slow" p14:dur="1250">
         <p15:prstTrans prst="peelOff"/>
       </p:transition>
     </mc:Choice>
-    <mc:Fallback>
+    <mc:Fallback xmlns="">
       <p:transition spd="slow">
         <p:fade/>
       </p:transition>
@@ -22912,13 +22891,13 @@
   <p:clrMapOvr>
     <a:masterClrMapping/>
   </p:clrMapOvr>
-  <mc:AlternateContent xmlns:mc="http://schemas.openxmlformats.org/markup-compatibility/2006">
-    <mc:Choice xmlns:p15="http://schemas.microsoft.com/office/powerpoint/2012/main" Requires="p15">
+  <mc:AlternateContent xmlns:mc="http://schemas.openxmlformats.org/markup-compatibility/2006" xmlns:p15="http://schemas.microsoft.com/office/powerpoint/2012/main">
+    <mc:Choice Requires="p15">
       <p:transition xmlns:p14="http://schemas.microsoft.com/office/powerpoint/2010/main" spd="slow" p14:dur="1250">
         <p15:prstTrans prst="peelOff"/>
       </p:transition>
     </mc:Choice>
-    <mc:Fallback>
+    <mc:Fallback xmlns="">
       <p:transition spd="slow">
         <p:fade/>
       </p:transition>
@@ -23310,13 +23289,13 @@
   <p:clrMapOvr>
     <a:masterClrMapping/>
   </p:clrMapOvr>
-  <mc:AlternateContent xmlns:mc="http://schemas.openxmlformats.org/markup-compatibility/2006">
-    <mc:Choice xmlns:p15="http://schemas.microsoft.com/office/powerpoint/2012/main" Requires="p15">
+  <mc:AlternateContent xmlns:mc="http://schemas.openxmlformats.org/markup-compatibility/2006" xmlns:p15="http://schemas.microsoft.com/office/powerpoint/2012/main">
+    <mc:Choice Requires="p15">
       <p:transition xmlns:p14="http://schemas.microsoft.com/office/powerpoint/2010/main" spd="slow" p14:dur="1250">
         <p15:prstTrans prst="peelOff"/>
       </p:transition>
     </mc:Choice>
-    <mc:Fallback>
+    <mc:Fallback xmlns="">
       <p:transition spd="slow">
         <p:fade/>
       </p:transition>
@@ -23867,13 +23846,13 @@
   <p:clrMapOvr>
     <a:masterClrMapping/>
   </p:clrMapOvr>
-  <mc:AlternateContent xmlns:mc="http://schemas.openxmlformats.org/markup-compatibility/2006">
-    <mc:Choice xmlns:p15="http://schemas.microsoft.com/office/powerpoint/2012/main" Requires="p15">
+  <mc:AlternateContent xmlns:mc="http://schemas.openxmlformats.org/markup-compatibility/2006" xmlns:p15="http://schemas.microsoft.com/office/powerpoint/2012/main">
+    <mc:Choice Requires="p15">
       <p:transition xmlns:p14="http://schemas.microsoft.com/office/powerpoint/2010/main" spd="slow" p14:dur="1250">
         <p15:prstTrans prst="peelOff"/>
       </p:transition>
     </mc:Choice>
-    <mc:Fallback>
+    <mc:Fallback xmlns="">
       <p:transition spd="slow">
         <p:fade/>
       </p:transition>
@@ -24676,13 +24655,13 @@
   <p:clrMapOvr>
     <a:masterClrMapping/>
   </p:clrMapOvr>
-  <mc:AlternateContent xmlns:mc="http://schemas.openxmlformats.org/markup-compatibility/2006">
-    <mc:Choice xmlns:p15="http://schemas.microsoft.com/office/powerpoint/2012/main" Requires="p15">
+  <mc:AlternateContent xmlns:mc="http://schemas.openxmlformats.org/markup-compatibility/2006" xmlns:p15="http://schemas.microsoft.com/office/powerpoint/2012/main">
+    <mc:Choice Requires="p15">
       <p:transition xmlns:p14="http://schemas.microsoft.com/office/powerpoint/2010/main" spd="slow" p14:dur="1250">
         <p15:prstTrans prst="peelOff"/>
       </p:transition>
     </mc:Choice>
-    <mc:Fallback>
+    <mc:Fallback xmlns="">
       <p:transition spd="slow">
         <p:fade/>
       </p:transition>
@@ -25074,13 +25053,13 @@
   <p:clrMapOvr>
     <a:masterClrMapping/>
   </p:clrMapOvr>
-  <mc:AlternateContent xmlns:mc="http://schemas.openxmlformats.org/markup-compatibility/2006">
-    <mc:Choice xmlns:p15="http://schemas.microsoft.com/office/powerpoint/2012/main" Requires="p15">
+  <mc:AlternateContent xmlns:mc="http://schemas.openxmlformats.org/markup-compatibility/2006" xmlns:p15="http://schemas.microsoft.com/office/powerpoint/2012/main">
+    <mc:Choice Requires="p15">
       <p:transition xmlns:p14="http://schemas.microsoft.com/office/powerpoint/2010/main" spd="slow" p14:dur="1250">
         <p15:prstTrans prst="peelOff"/>
       </p:transition>
     </mc:Choice>
-    <mc:Fallback>
+    <mc:Fallback xmlns="">
       <p:transition spd="slow">
         <p:fade/>
       </p:transition>
@@ -25558,13 +25537,13 @@
   <p:clrMapOvr>
     <a:masterClrMapping/>
   </p:clrMapOvr>
-  <mc:AlternateContent xmlns:mc="http://schemas.openxmlformats.org/markup-compatibility/2006">
-    <mc:Choice xmlns:p15="http://schemas.microsoft.com/office/powerpoint/2012/main" Requires="p15">
+  <mc:AlternateContent xmlns:mc="http://schemas.openxmlformats.org/markup-compatibility/2006" xmlns:p15="http://schemas.microsoft.com/office/powerpoint/2012/main">
+    <mc:Choice Requires="p15">
       <p:transition xmlns:p14="http://schemas.microsoft.com/office/powerpoint/2010/main" spd="slow" p14:dur="1250">
         <p15:prstTrans prst="peelOff"/>
       </p:transition>
     </mc:Choice>
-    <mc:Fallback>
+    <mc:Fallback xmlns="">
       <p:transition spd="slow">
         <p:fade/>
       </p:transition>
@@ -26473,13 +26452,13 @@
   <p:clrMapOvr>
     <a:masterClrMapping/>
   </p:clrMapOvr>
-  <mc:AlternateContent xmlns:mc="http://schemas.openxmlformats.org/markup-compatibility/2006">
-    <mc:Choice xmlns:p15="http://schemas.microsoft.com/office/powerpoint/2012/main" Requires="p15">
+  <mc:AlternateContent xmlns:mc="http://schemas.openxmlformats.org/markup-compatibility/2006" xmlns:p15="http://schemas.microsoft.com/office/powerpoint/2012/main">
+    <mc:Choice Requires="p15">
       <p:transition xmlns:p14="http://schemas.microsoft.com/office/powerpoint/2010/main" spd="slow" p14:dur="1250">
         <p15:prstTrans prst="peelOff"/>
       </p:transition>
     </mc:Choice>
-    <mc:Fallback>
+    <mc:Fallback xmlns="">
       <p:transition spd="slow">
         <p:fade/>
       </p:transition>

</xml_diff>